<commit_message>
Added source to the variable name rules
</commit_message>
<xml_diff>
--- a/Presentations/Variables.pptx
+++ b/Presentations/Variables.pptx
@@ -328,7 +328,7 @@
           <a:p>
             <a:fld id="{3A9F9E6B-09B7-4F00-9B08-24D3DD32A6A7}" type="datetimeFigureOut">
               <a:rPr lang="en-CA" smtClean="0"/>
-              <a:t>2024-09-24</a:t>
+              <a:t>2024-09-25</a:t>
             </a:fld>
             <a:endParaRPr lang="en-CA"/>
           </a:p>
@@ -836,10 +836,47 @@
           <a:bodyPr/>
           <a:lstStyle/>
           <a:p>
-            <a:r>
-              <a:rPr lang="en-CA" dirty="0"/>
-              <a:t>https://docs.python.org/3/c-api/memory.html</a:t>
-            </a:r>
+            <a:pPr marL="0" marR="0" lvl="0" indent="0" algn="l" defTabSz="914400" rtl="0" eaLnBrk="1" fontAlgn="auto" latinLnBrk="0" hangingPunct="1">
+              <a:lnSpc>
+                <a:spcPct val="100000"/>
+              </a:lnSpc>
+              <a:spcBef>
+                <a:spcPts val="0"/>
+              </a:spcBef>
+              <a:spcAft>
+                <a:spcPts val="0"/>
+              </a:spcAft>
+              <a:buClrTx/>
+              <a:buSzTx/>
+              <a:buFontTx/>
+              <a:buNone/>
+              <a:tabLst/>
+              <a:defRPr/>
+            </a:pPr>
+            <a:r>
+              <a:rPr lang="en-US" dirty="0"/>
+              <a:t>Python variable names source: </a:t>
+            </a:r>
+            <a:r>
+              <a:rPr lang="en-CA" b="0" dirty="0">
+                <a:solidFill>
+                  <a:srgbClr val="CE9178"/>
+                </a:solidFill>
+                <a:effectLst/>
+                <a:latin typeface="Consolas" panose="020B0609020204030204" pitchFamily="49" charset="0"/>
+              </a:rPr>
+              <a:t>https://www.w3schools.com/python/python_variables_names.asp</a:t>
+            </a:r>
+            <a:endParaRPr lang="en-CA" b="0" dirty="0">
+              <a:solidFill>
+                <a:srgbClr val="CCCCCC"/>
+              </a:solidFill>
+              <a:effectLst/>
+              <a:latin typeface="Consolas" panose="020B0609020204030204" pitchFamily="49" charset="0"/>
+            </a:endParaRPr>
+          </a:p>
+          <a:p>
+            <a:endParaRPr lang="en-CA" dirty="0"/>
           </a:p>
         </p:txBody>
       </p:sp>
@@ -860,7 +897,7 @@
           <a:p>
             <a:fld id="{22D03D6D-AB2C-4575-A491-C87785FC62B5}" type="slidenum">
               <a:rPr lang="en-CA" smtClean="0"/>
-              <a:t>11</a:t>
+              <a:t>10</a:t>
             </a:fld>
             <a:endParaRPr lang="en-CA"/>
           </a:p>
@@ -869,7 +906,7 @@
     </p:spTree>
     <p:extLst>
       <p:ext uri="{BB962C8B-B14F-4D97-AF65-F5344CB8AC3E}">
-        <p14:creationId xmlns:p14="http://schemas.microsoft.com/office/powerpoint/2010/main" val="475776252"/>
+        <p14:creationId xmlns:p14="http://schemas.microsoft.com/office/powerpoint/2010/main" val="3082776108"/>
       </p:ext>
     </p:extLst>
   </p:cSld>
@@ -925,15 +962,7 @@
           <a:p>
             <a:r>
               <a:rPr lang="en-CA" dirty="0"/>
-              <a:t>Image: </a:t>
-            </a:r>
-            <a:r>
-              <a:rPr lang="en-CA" dirty="0" err="1"/>
-              <a:t>OpenClipart</a:t>
-            </a:r>
-            <a:r>
-              <a:rPr lang="en-CA" dirty="0"/>
-              <a:t>-Vectors, CC0, via Wikimedia Commons. Link to the image:  https://commons.wikimedia.org/wiki/File:Alert-Stop-Warning-Error_icon.svg , link to the license: https://creativecommons.org/publicdomain/zero/1.0/deed.en</a:t>
+              <a:t>https://docs.python.org/3/c-api/memory.html</a:t>
             </a:r>
           </a:p>
         </p:txBody>
@@ -955,7 +984,7 @@
           <a:p>
             <a:fld id="{22D03D6D-AB2C-4575-A491-C87785FC62B5}" type="slidenum">
               <a:rPr lang="en-CA" smtClean="0"/>
-              <a:t>18</a:t>
+              <a:t>11</a:t>
             </a:fld>
             <a:endParaRPr lang="en-CA"/>
           </a:p>
@@ -964,7 +993,7 @@
     </p:spTree>
     <p:extLst>
       <p:ext uri="{BB962C8B-B14F-4D97-AF65-F5344CB8AC3E}">
-        <p14:creationId xmlns:p14="http://schemas.microsoft.com/office/powerpoint/2010/main" val="3981516594"/>
+        <p14:creationId xmlns:p14="http://schemas.microsoft.com/office/powerpoint/2010/main" val="475776252"/>
       </p:ext>
     </p:extLst>
   </p:cSld>
@@ -1020,7 +1049,15 @@
           <a:p>
             <a:r>
               <a:rPr lang="en-CA" dirty="0"/>
-              <a:t>Image: Painter06, CC0, via Wikimedia Commons</a:t>
+              <a:t>Image: </a:t>
+            </a:r>
+            <a:r>
+              <a:rPr lang="en-CA" dirty="0" err="1"/>
+              <a:t>OpenClipart</a:t>
+            </a:r>
+            <a:r>
+              <a:rPr lang="en-CA" dirty="0"/>
+              <a:t>-Vectors, CC0, via Wikimedia Commons. Link to the image:  https://commons.wikimedia.org/wiki/File:Alert-Stop-Warning-Error_icon.svg , link to the license: https://creativecommons.org/publicdomain/zero/1.0/deed.en</a:t>
             </a:r>
           </a:p>
         </p:txBody>
@@ -1042,7 +1079,7 @@
           <a:p>
             <a:fld id="{22D03D6D-AB2C-4575-A491-C87785FC62B5}" type="slidenum">
               <a:rPr lang="en-CA" smtClean="0"/>
-              <a:t>24</a:t>
+              <a:t>18</a:t>
             </a:fld>
             <a:endParaRPr lang="en-CA"/>
           </a:p>
@@ -1051,7 +1088,7 @@
     </p:spTree>
     <p:extLst>
       <p:ext uri="{BB962C8B-B14F-4D97-AF65-F5344CB8AC3E}">
-        <p14:creationId xmlns:p14="http://schemas.microsoft.com/office/powerpoint/2010/main" val="2076358863"/>
+        <p14:creationId xmlns:p14="http://schemas.microsoft.com/office/powerpoint/2010/main" val="3981516594"/>
       </p:ext>
     </p:extLst>
   </p:cSld>
@@ -1107,6 +1144,93 @@
           <a:p>
             <a:r>
               <a:rPr lang="en-CA" dirty="0"/>
+              <a:t>Image: Painter06, CC0, via Wikimedia Commons</a:t>
+            </a:r>
+          </a:p>
+        </p:txBody>
+      </p:sp>
+      <p:sp>
+        <p:nvSpPr>
+          <p:cNvPr id="4" name="Slide Number Placeholder 3"/>
+          <p:cNvSpPr>
+            <a:spLocks noGrp="1"/>
+          </p:cNvSpPr>
+          <p:nvPr>
+            <p:ph type="sldNum" sz="quarter" idx="5"/>
+          </p:nvPr>
+        </p:nvSpPr>
+        <p:spPr/>
+        <p:txBody>
+          <a:bodyPr/>
+          <a:lstStyle/>
+          <a:p>
+            <a:fld id="{22D03D6D-AB2C-4575-A491-C87785FC62B5}" type="slidenum">
+              <a:rPr lang="en-CA" smtClean="0"/>
+              <a:t>24</a:t>
+            </a:fld>
+            <a:endParaRPr lang="en-CA"/>
+          </a:p>
+        </p:txBody>
+      </p:sp>
+    </p:spTree>
+    <p:extLst>
+      <p:ext uri="{BB962C8B-B14F-4D97-AF65-F5344CB8AC3E}">
+        <p14:creationId xmlns:p14="http://schemas.microsoft.com/office/powerpoint/2010/main" val="2076358863"/>
+      </p:ext>
+    </p:extLst>
+  </p:cSld>
+  <p:clrMapOvr>
+    <a:masterClrMapping/>
+  </p:clrMapOvr>
+</p:notes>
+</file>
+
+<file path=ppt/notesSlides/notesSlide7.xml><?xml version="1.0" encoding="utf-8"?>
+<p:notes xmlns:a="http://schemas.openxmlformats.org/drawingml/2006/main" xmlns:r="http://schemas.openxmlformats.org/officeDocument/2006/relationships" xmlns:p="http://schemas.openxmlformats.org/presentationml/2006/main">
+  <p:cSld>
+    <p:spTree>
+      <p:nvGrpSpPr>
+        <p:cNvPr id="1" name=""/>
+        <p:cNvGrpSpPr/>
+        <p:nvPr/>
+      </p:nvGrpSpPr>
+      <p:grpSpPr>
+        <a:xfrm>
+          <a:off x="0" y="0"/>
+          <a:ext cx="0" cy="0"/>
+          <a:chOff x="0" y="0"/>
+          <a:chExt cx="0" cy="0"/>
+        </a:xfrm>
+      </p:grpSpPr>
+      <p:sp>
+        <p:nvSpPr>
+          <p:cNvPr id="2" name="Slide Image Placeholder 1"/>
+          <p:cNvSpPr>
+            <a:spLocks noGrp="1" noRot="1" noChangeAspect="1"/>
+          </p:cNvSpPr>
+          <p:nvPr>
+            <p:ph type="sldImg"/>
+          </p:nvPr>
+        </p:nvSpPr>
+        <p:spPr/>
+      </p:sp>
+      <p:sp>
+        <p:nvSpPr>
+          <p:cNvPr id="3" name="Notes Placeholder 2"/>
+          <p:cNvSpPr>
+            <a:spLocks noGrp="1"/>
+          </p:cNvSpPr>
+          <p:nvPr>
+            <p:ph type="body" idx="1"/>
+          </p:nvPr>
+        </p:nvSpPr>
+        <p:spPr/>
+        <p:txBody>
+          <a:bodyPr/>
+          <a:lstStyle/>
+          <a:p>
+            <a:r>
+              <a:rPr lang="en-CA" dirty="0"/>
               <a:t>Image: Videoplasty.com, CC BY-SA 4.0 &lt;https://creativecommons.org/licenses/by-sa/4.0&gt;, via Wikimedia Commons Creative Commons Attribution-</a:t>
             </a:r>
             <a:r>
@@ -1156,7 +1280,7 @@
 </p:notes>
 </file>
 
-<file path=ppt/notesSlides/notesSlide7.xml><?xml version="1.0" encoding="utf-8"?>
+<file path=ppt/notesSlides/notesSlide8.xml><?xml version="1.0" encoding="utf-8"?>
 <p:notes xmlns:a="http://schemas.openxmlformats.org/drawingml/2006/main" xmlns:r="http://schemas.openxmlformats.org/officeDocument/2006/relationships" xmlns:p="http://schemas.openxmlformats.org/presentationml/2006/main">
   <p:cSld>
     <p:spTree>
@@ -1426,7 +1550,7 @@
           <a:p>
             <a:fld id="{367B5FE2-6749-4FF3-B051-5632553A43DC}" type="datetimeFigureOut">
               <a:rPr lang="en-CA" smtClean="0"/>
-              <a:t>2024-09-24</a:t>
+              <a:t>2024-09-25</a:t>
             </a:fld>
             <a:endParaRPr lang="en-CA"/>
           </a:p>
@@ -1701,7 +1825,7 @@
           <a:p>
             <a:fld id="{367B5FE2-6749-4FF3-B051-5632553A43DC}" type="datetimeFigureOut">
               <a:rPr lang="en-CA" smtClean="0"/>
-              <a:t>2024-09-24</a:t>
+              <a:t>2024-09-25</a:t>
             </a:fld>
             <a:endParaRPr lang="en-CA"/>
           </a:p>
@@ -1895,7 +2019,7 @@
           <a:p>
             <a:fld id="{367B5FE2-6749-4FF3-B051-5632553A43DC}" type="datetimeFigureOut">
               <a:rPr lang="en-CA" smtClean="0"/>
-              <a:t>2024-09-24</a:t>
+              <a:t>2024-09-25</a:t>
             </a:fld>
             <a:endParaRPr lang="en-CA"/>
           </a:p>
@@ -2168,7 +2292,7 @@
           <a:p>
             <a:fld id="{367B5FE2-6749-4FF3-B051-5632553A43DC}" type="datetimeFigureOut">
               <a:rPr lang="en-CA" smtClean="0"/>
-              <a:t>2024-09-24</a:t>
+              <a:t>2024-09-25</a:t>
             </a:fld>
             <a:endParaRPr lang="en-CA"/>
           </a:p>
@@ -2509,7 +2633,7 @@
           <a:p>
             <a:fld id="{367B5FE2-6749-4FF3-B051-5632553A43DC}" type="datetimeFigureOut">
               <a:rPr lang="en-CA" smtClean="0"/>
-              <a:t>2024-09-24</a:t>
+              <a:t>2024-09-25</a:t>
             </a:fld>
             <a:endParaRPr lang="en-CA"/>
           </a:p>
@@ -3132,7 +3256,7 @@
           <a:p>
             <a:fld id="{367B5FE2-6749-4FF3-B051-5632553A43DC}" type="datetimeFigureOut">
               <a:rPr lang="en-CA" smtClean="0"/>
-              <a:t>2024-09-24</a:t>
+              <a:t>2024-09-25</a:t>
             </a:fld>
             <a:endParaRPr lang="en-CA"/>
           </a:p>
@@ -3992,7 +4116,7 @@
           <a:p>
             <a:fld id="{367B5FE2-6749-4FF3-B051-5632553A43DC}" type="datetimeFigureOut">
               <a:rPr lang="en-CA" smtClean="0"/>
-              <a:t>2024-09-24</a:t>
+              <a:t>2024-09-25</a:t>
             </a:fld>
             <a:endParaRPr lang="en-CA"/>
           </a:p>
@@ -4162,7 +4286,7 @@
           <a:p>
             <a:fld id="{367B5FE2-6749-4FF3-B051-5632553A43DC}" type="datetimeFigureOut">
               <a:rPr lang="en-CA" smtClean="0"/>
-              <a:t>2024-09-24</a:t>
+              <a:t>2024-09-25</a:t>
             </a:fld>
             <a:endParaRPr lang="en-CA"/>
           </a:p>
@@ -4342,7 +4466,7 @@
           <a:p>
             <a:fld id="{367B5FE2-6749-4FF3-B051-5632553A43DC}" type="datetimeFigureOut">
               <a:rPr lang="en-CA" smtClean="0"/>
-              <a:t>2024-09-24</a:t>
+              <a:t>2024-09-25</a:t>
             </a:fld>
             <a:endParaRPr lang="en-CA"/>
           </a:p>
@@ -4512,7 +4636,7 @@
           <a:p>
             <a:fld id="{367B5FE2-6749-4FF3-B051-5632553A43DC}" type="datetimeFigureOut">
               <a:rPr lang="en-CA" smtClean="0"/>
-              <a:t>2024-09-24</a:t>
+              <a:t>2024-09-25</a:t>
             </a:fld>
             <a:endParaRPr lang="en-CA"/>
           </a:p>
@@ -4759,7 +4883,7 @@
           <a:p>
             <a:fld id="{367B5FE2-6749-4FF3-B051-5632553A43DC}" type="datetimeFigureOut">
               <a:rPr lang="en-CA" smtClean="0"/>
-              <a:t>2024-09-24</a:t>
+              <a:t>2024-09-25</a:t>
             </a:fld>
             <a:endParaRPr lang="en-CA"/>
           </a:p>
@@ -5051,7 +5175,7 @@
           <a:p>
             <a:fld id="{367B5FE2-6749-4FF3-B051-5632553A43DC}" type="datetimeFigureOut">
               <a:rPr lang="en-CA" smtClean="0"/>
-              <a:t>2024-09-24</a:t>
+              <a:t>2024-09-25</a:t>
             </a:fld>
             <a:endParaRPr lang="en-CA"/>
           </a:p>
@@ -5495,7 +5619,7 @@
           <a:p>
             <a:fld id="{367B5FE2-6749-4FF3-B051-5632553A43DC}" type="datetimeFigureOut">
               <a:rPr lang="en-CA" smtClean="0"/>
-              <a:t>2024-09-24</a:t>
+              <a:t>2024-09-25</a:t>
             </a:fld>
             <a:endParaRPr lang="en-CA"/>
           </a:p>
@@ -5613,7 +5737,7 @@
           <a:p>
             <a:fld id="{367B5FE2-6749-4FF3-B051-5632553A43DC}" type="datetimeFigureOut">
               <a:rPr lang="en-CA" smtClean="0"/>
-              <a:t>2024-09-24</a:t>
+              <a:t>2024-09-25</a:t>
             </a:fld>
             <a:endParaRPr lang="en-CA"/>
           </a:p>
@@ -5708,7 +5832,7 @@
           <a:p>
             <a:fld id="{367B5FE2-6749-4FF3-B051-5632553A43DC}" type="datetimeFigureOut">
               <a:rPr lang="en-CA" smtClean="0"/>
-              <a:t>2024-09-24</a:t>
+              <a:t>2024-09-25</a:t>
             </a:fld>
             <a:endParaRPr lang="en-CA"/>
           </a:p>
@@ -5987,7 +6111,7 @@
           <a:p>
             <a:fld id="{367B5FE2-6749-4FF3-B051-5632553A43DC}" type="datetimeFigureOut">
               <a:rPr lang="en-CA" smtClean="0"/>
-              <a:t>2024-09-24</a:t>
+              <a:t>2024-09-25</a:t>
             </a:fld>
             <a:endParaRPr lang="en-CA"/>
           </a:p>
@@ -6262,7 +6386,7 @@
           <a:p>
             <a:fld id="{367B5FE2-6749-4FF3-B051-5632553A43DC}" type="datetimeFigureOut">
               <a:rPr lang="en-CA" smtClean="0"/>
-              <a:t>2024-09-24</a:t>
+              <a:t>2024-09-25</a:t>
             </a:fld>
             <a:endParaRPr lang="en-CA"/>
           </a:p>
@@ -6691,7 +6815,7 @@
           <a:p>
             <a:fld id="{367B5FE2-6749-4FF3-B051-5632553A43DC}" type="datetimeFigureOut">
               <a:rPr lang="en-CA" smtClean="0"/>
-              <a:t>2024-09-24</a:t>
+              <a:t>2024-09-25</a:t>
             </a:fld>
             <a:endParaRPr lang="en-CA"/>
           </a:p>
@@ -7714,7 +7838,7 @@
       </p:sp>
       <mc:AlternateContent xmlns:mc="http://schemas.openxmlformats.org/markup-compatibility/2006" xmlns:p14="http://schemas.microsoft.com/office/powerpoint/2010/main">
         <mc:Choice Requires="p14">
-          <p:contentPart p14:bwMode="auto" r:id="rId2">
+          <p:contentPart p14:bwMode="auto" r:id="rId3">
             <p14:nvContentPartPr>
               <p14:cNvPr id="7" name="Ink 6">
                 <a:extLst>
@@ -7746,7 +7870,7 @@
               <p:nvPr/>
             </p:nvPicPr>
             <p:blipFill>
-              <a:blip r:embed="rId3"/>
+              <a:blip r:embed="rId4"/>
               <a:stretch>
                 <a:fillRect/>
               </a:stretch>
@@ -7765,7 +7889,7 @@
       </mc:AlternateContent>
       <mc:AlternateContent xmlns:mc="http://schemas.openxmlformats.org/markup-compatibility/2006" xmlns:p14="http://schemas.microsoft.com/office/powerpoint/2010/main">
         <mc:Choice Requires="p14">
-          <p:contentPart p14:bwMode="auto" r:id="rId4">
+          <p:contentPart p14:bwMode="auto" r:id="rId5">
             <p14:nvContentPartPr>
               <p14:cNvPr id="8" name="Ink 7">
                 <a:extLst>
@@ -7797,7 +7921,7 @@
               <p:nvPr/>
             </p:nvPicPr>
             <p:blipFill>
-              <a:blip r:embed="rId5"/>
+              <a:blip r:embed="rId6"/>
               <a:stretch>
                 <a:fillRect/>
               </a:stretch>

</xml_diff>